<commit_message>
Paper: revise performance section.
</commit_message>
<xml_diff>
--- a/paper/figures/strategy_perf_annotated.pptx
+++ b/paper/figures/strategy_perf_annotated.pptx
@@ -3219,6 +3219,145 @@
           </p:spPr>
         </p:pic>
       </p:grpSp>
+      <p:sp>
+        <p:nvSpPr>
+          <p:cNvPr id="18" name="TextBox 17"/>
+          <p:cNvSpPr txBox="1"/>
+          <p:nvPr/>
+        </p:nvSpPr>
+        <p:spPr>
+          <a:xfrm>
+            <a:off x="651290" y="4529393"/>
+            <a:ext cx="1436612" cy="784830"/>
+          </a:xfrm>
+          <a:prstGeom prst="rect">
+            <a:avLst/>
+          </a:prstGeom>
+          <a:solidFill>
+            <a:schemeClr val="bg1"/>
+          </a:solidFill>
+        </p:spPr>
+        <p:txBody>
+          <a:bodyPr wrap="none" rtlCol="0">
+            <a:spAutoFit/>
+          </a:bodyPr>
+          <a:lstStyle/>
+          <a:p>
+            <a:endParaRPr lang="en-US" sz="900" dirty="0" smtClean="0">
+              <a:latin typeface="DejaVu Sans" panose="020B0603030804020204" pitchFamily="34" charset="0"/>
+              <a:ea typeface="DejaVu Sans" panose="020B0603030804020204" pitchFamily="34" charset="0"/>
+              <a:cs typeface="DejaVu Sans" panose="020B0603030804020204" pitchFamily="34" charset="0"/>
+            </a:endParaRPr>
+          </a:p>
+          <a:p>
+            <a:r>
+              <a:rPr lang="en-US" sz="900" dirty="0" smtClean="0">
+                <a:latin typeface="DejaVu Sans" panose="020B0603030804020204" pitchFamily="34" charset="0"/>
+                <a:ea typeface="DejaVu Sans" panose="020B0603030804020204" pitchFamily="34" charset="0"/>
+                <a:cs typeface="DejaVu Sans" panose="020B0603030804020204" pitchFamily="34" charset="0"/>
+              </a:rPr>
+              <a:t>Landing method:</a:t>
+            </a:r>
+          </a:p>
+          <a:p>
+            <a:r>
+              <a:rPr lang="en-US" sz="900" dirty="0" err="1" smtClean="0">
+                <a:latin typeface="DejaVu Sans" panose="020B0603030804020204" pitchFamily="34" charset="0"/>
+                <a:ea typeface="DejaVu Sans" panose="020B0603030804020204" pitchFamily="34" charset="0"/>
+                <a:cs typeface="DejaVu Sans" panose="020B0603030804020204" pitchFamily="34" charset="0"/>
+              </a:rPr>
+              <a:t>Recov</a:t>
+            </a:r>
+            <a:r>
+              <a:rPr lang="en-US" sz="900" dirty="0" smtClean="0">
+                <a:latin typeface="DejaVu Sans" panose="020B0603030804020204" pitchFamily="34" charset="0"/>
+                <a:ea typeface="DejaVu Sans" panose="020B0603030804020204" pitchFamily="34" charset="0"/>
+                <a:cs typeface="DejaVu Sans" panose="020B0603030804020204" pitchFamily="34" charset="0"/>
+              </a:rPr>
+              <a:t>. prop. method:</a:t>
+            </a:r>
+          </a:p>
+          <a:p>
+            <a:r>
+              <a:rPr lang="en-US" sz="900" dirty="0" smtClean="0">
+                <a:latin typeface="DejaVu Sans" panose="020B0603030804020204" pitchFamily="34" charset="0"/>
+                <a:ea typeface="DejaVu Sans" panose="020B0603030804020204" pitchFamily="34" charset="0"/>
+                <a:cs typeface="DejaVu Sans" panose="020B0603030804020204" pitchFamily="34" charset="0"/>
+              </a:rPr>
+              <a:t>Portion </a:t>
+            </a:r>
+            <a:r>
+              <a:rPr lang="en-US" sz="900" dirty="0" err="1" smtClean="0">
+                <a:latin typeface="DejaVu Sans" panose="020B0603030804020204" pitchFamily="34" charset="0"/>
+                <a:ea typeface="DejaVu Sans" panose="020B0603030804020204" pitchFamily="34" charset="0"/>
+                <a:cs typeface="DejaVu Sans" panose="020B0603030804020204" pitchFamily="34" charset="0"/>
+              </a:rPr>
+              <a:t>recov’d</a:t>
+            </a:r>
+            <a:r>
+              <a:rPr lang="en-US" sz="900" dirty="0" smtClean="0">
+                <a:latin typeface="DejaVu Sans" panose="020B0603030804020204" pitchFamily="34" charset="0"/>
+                <a:ea typeface="DejaVu Sans" panose="020B0603030804020204" pitchFamily="34" charset="0"/>
+                <a:cs typeface="DejaVu Sans" panose="020B0603030804020204" pitchFamily="34" charset="0"/>
+              </a:rPr>
+              <a:t>:</a:t>
+            </a:r>
+          </a:p>
+          <a:p>
+            <a:endParaRPr lang="en-US" sz="900" dirty="0">
+              <a:latin typeface="DejaVu Sans" panose="020B0603030804020204" pitchFamily="34" charset="0"/>
+              <a:ea typeface="DejaVu Sans" panose="020B0603030804020204" pitchFamily="34" charset="0"/>
+              <a:cs typeface="DejaVu Sans" panose="020B0603030804020204" pitchFamily="34" charset="0"/>
+            </a:endParaRPr>
+          </a:p>
+        </p:txBody>
+      </p:sp>
+      <p:sp>
+        <p:nvSpPr>
+          <p:cNvPr id="20" name="TextBox 19"/>
+          <p:cNvSpPr txBox="1"/>
+          <p:nvPr/>
+        </p:nvSpPr>
+        <p:spPr>
+          <a:xfrm>
+            <a:off x="947458" y="4267685"/>
+            <a:ext cx="1015021" cy="261610"/>
+          </a:xfrm>
+          <a:prstGeom prst="rect">
+            <a:avLst/>
+          </a:prstGeom>
+          <a:noFill/>
+        </p:spPr>
+        <p:txBody>
+          <a:bodyPr wrap="none" rtlCol="0">
+            <a:spAutoFit/>
+          </a:bodyPr>
+          <a:lstStyle/>
+          <a:p>
+            <a:r>
+              <a:rPr lang="en-US" sz="1100" dirty="0">
+                <a:latin typeface="DejaVu Sans" panose="020B0603030804020204" pitchFamily="34" charset="0"/>
+                <a:ea typeface="DejaVu Sans" panose="020B0603030804020204" pitchFamily="34" charset="0"/>
+                <a:cs typeface="DejaVu Sans" panose="020B0603030804020204" pitchFamily="34" charset="0"/>
+              </a:rPr>
+              <a:t>E</a:t>
+            </a:r>
+            <a:r>
+              <a:rPr lang="en-US" sz="1100" dirty="0" smtClean="0">
+                <a:latin typeface="DejaVu Sans" panose="020B0603030804020204" pitchFamily="34" charset="0"/>
+                <a:ea typeface="DejaVu Sans" panose="020B0603030804020204" pitchFamily="34" charset="0"/>
+                <a:cs typeface="DejaVu Sans" panose="020B0603030804020204" pitchFamily="34" charset="0"/>
+              </a:rPr>
+              <a:t>xpendable</a:t>
+            </a:r>
+            <a:endParaRPr lang="en-US" sz="1100" dirty="0">
+              <a:latin typeface="DejaVu Sans" panose="020B0603030804020204" pitchFamily="34" charset="0"/>
+              <a:ea typeface="DejaVu Sans" panose="020B0603030804020204" pitchFamily="34" charset="0"/>
+              <a:cs typeface="DejaVu Sans" panose="020B0603030804020204" pitchFamily="34" charset="0"/>
+            </a:endParaRPr>
+          </a:p>
+        </p:txBody>
+      </p:sp>
     </p:spTree>
     <p:extLst>
       <p:ext uri="{BB962C8B-B14F-4D97-AF65-F5344CB8AC3E}">
@@ -3497,6 +3636,145 @@
           </p:spPr>
         </p:pic>
       </p:grpSp>
+      <p:sp>
+        <p:nvSpPr>
+          <p:cNvPr id="14" name="TextBox 13"/>
+          <p:cNvSpPr txBox="1"/>
+          <p:nvPr/>
+        </p:nvSpPr>
+        <p:spPr>
+          <a:xfrm>
+            <a:off x="530640" y="4529393"/>
+            <a:ext cx="1436612" cy="784830"/>
+          </a:xfrm>
+          <a:prstGeom prst="rect">
+            <a:avLst/>
+          </a:prstGeom>
+          <a:solidFill>
+            <a:schemeClr val="bg1"/>
+          </a:solidFill>
+        </p:spPr>
+        <p:txBody>
+          <a:bodyPr wrap="none" rtlCol="0">
+            <a:spAutoFit/>
+          </a:bodyPr>
+          <a:lstStyle/>
+          <a:p>
+            <a:endParaRPr lang="en-US" sz="900" dirty="0" smtClean="0">
+              <a:latin typeface="DejaVu Sans" panose="020B0603030804020204" pitchFamily="34" charset="0"/>
+              <a:ea typeface="DejaVu Sans" panose="020B0603030804020204" pitchFamily="34" charset="0"/>
+              <a:cs typeface="DejaVu Sans" panose="020B0603030804020204" pitchFamily="34" charset="0"/>
+            </a:endParaRPr>
+          </a:p>
+          <a:p>
+            <a:r>
+              <a:rPr lang="en-US" sz="900" dirty="0" smtClean="0">
+                <a:latin typeface="DejaVu Sans" panose="020B0603030804020204" pitchFamily="34" charset="0"/>
+                <a:ea typeface="DejaVu Sans" panose="020B0603030804020204" pitchFamily="34" charset="0"/>
+                <a:cs typeface="DejaVu Sans" panose="020B0603030804020204" pitchFamily="34" charset="0"/>
+              </a:rPr>
+              <a:t>Landing method:</a:t>
+            </a:r>
+          </a:p>
+          <a:p>
+            <a:r>
+              <a:rPr lang="en-US" sz="900" dirty="0" err="1" smtClean="0">
+                <a:latin typeface="DejaVu Sans" panose="020B0603030804020204" pitchFamily="34" charset="0"/>
+                <a:ea typeface="DejaVu Sans" panose="020B0603030804020204" pitchFamily="34" charset="0"/>
+                <a:cs typeface="DejaVu Sans" panose="020B0603030804020204" pitchFamily="34" charset="0"/>
+              </a:rPr>
+              <a:t>Recov</a:t>
+            </a:r>
+            <a:r>
+              <a:rPr lang="en-US" sz="900" dirty="0" smtClean="0">
+                <a:latin typeface="DejaVu Sans" panose="020B0603030804020204" pitchFamily="34" charset="0"/>
+                <a:ea typeface="DejaVu Sans" panose="020B0603030804020204" pitchFamily="34" charset="0"/>
+                <a:cs typeface="DejaVu Sans" panose="020B0603030804020204" pitchFamily="34" charset="0"/>
+              </a:rPr>
+              <a:t>. prop. method:</a:t>
+            </a:r>
+          </a:p>
+          <a:p>
+            <a:r>
+              <a:rPr lang="en-US" sz="900" dirty="0" smtClean="0">
+                <a:latin typeface="DejaVu Sans" panose="020B0603030804020204" pitchFamily="34" charset="0"/>
+                <a:ea typeface="DejaVu Sans" panose="020B0603030804020204" pitchFamily="34" charset="0"/>
+                <a:cs typeface="DejaVu Sans" panose="020B0603030804020204" pitchFamily="34" charset="0"/>
+              </a:rPr>
+              <a:t>Portion </a:t>
+            </a:r>
+            <a:r>
+              <a:rPr lang="en-US" sz="900" dirty="0" err="1" smtClean="0">
+                <a:latin typeface="DejaVu Sans" panose="020B0603030804020204" pitchFamily="34" charset="0"/>
+                <a:ea typeface="DejaVu Sans" panose="020B0603030804020204" pitchFamily="34" charset="0"/>
+                <a:cs typeface="DejaVu Sans" panose="020B0603030804020204" pitchFamily="34" charset="0"/>
+              </a:rPr>
+              <a:t>recov’d</a:t>
+            </a:r>
+            <a:r>
+              <a:rPr lang="en-US" sz="900" dirty="0" smtClean="0">
+                <a:latin typeface="DejaVu Sans" panose="020B0603030804020204" pitchFamily="34" charset="0"/>
+                <a:ea typeface="DejaVu Sans" panose="020B0603030804020204" pitchFamily="34" charset="0"/>
+                <a:cs typeface="DejaVu Sans" panose="020B0603030804020204" pitchFamily="34" charset="0"/>
+              </a:rPr>
+              <a:t>:</a:t>
+            </a:r>
+          </a:p>
+          <a:p>
+            <a:endParaRPr lang="en-US" sz="900" dirty="0">
+              <a:latin typeface="DejaVu Sans" panose="020B0603030804020204" pitchFamily="34" charset="0"/>
+              <a:ea typeface="DejaVu Sans" panose="020B0603030804020204" pitchFamily="34" charset="0"/>
+              <a:cs typeface="DejaVu Sans" panose="020B0603030804020204" pitchFamily="34" charset="0"/>
+            </a:endParaRPr>
+          </a:p>
+        </p:txBody>
+      </p:sp>
+      <p:sp>
+        <p:nvSpPr>
+          <p:cNvPr id="15" name="TextBox 14"/>
+          <p:cNvSpPr txBox="1"/>
+          <p:nvPr/>
+        </p:nvSpPr>
+        <p:spPr>
+          <a:xfrm>
+            <a:off x="826808" y="4267685"/>
+            <a:ext cx="1015021" cy="261610"/>
+          </a:xfrm>
+          <a:prstGeom prst="rect">
+            <a:avLst/>
+          </a:prstGeom>
+          <a:noFill/>
+        </p:spPr>
+        <p:txBody>
+          <a:bodyPr wrap="none" rtlCol="0">
+            <a:spAutoFit/>
+          </a:bodyPr>
+          <a:lstStyle/>
+          <a:p>
+            <a:r>
+              <a:rPr lang="en-US" sz="1100" dirty="0">
+                <a:latin typeface="DejaVu Sans" panose="020B0603030804020204" pitchFamily="34" charset="0"/>
+                <a:ea typeface="DejaVu Sans" panose="020B0603030804020204" pitchFamily="34" charset="0"/>
+                <a:cs typeface="DejaVu Sans" panose="020B0603030804020204" pitchFamily="34" charset="0"/>
+              </a:rPr>
+              <a:t>E</a:t>
+            </a:r>
+            <a:r>
+              <a:rPr lang="en-US" sz="1100" dirty="0" smtClean="0">
+                <a:latin typeface="DejaVu Sans" panose="020B0603030804020204" pitchFamily="34" charset="0"/>
+                <a:ea typeface="DejaVu Sans" panose="020B0603030804020204" pitchFamily="34" charset="0"/>
+                <a:cs typeface="DejaVu Sans" panose="020B0603030804020204" pitchFamily="34" charset="0"/>
+              </a:rPr>
+              <a:t>xpendable</a:t>
+            </a:r>
+            <a:endParaRPr lang="en-US" sz="1100" dirty="0">
+              <a:latin typeface="DejaVu Sans" panose="020B0603030804020204" pitchFamily="34" charset="0"/>
+              <a:ea typeface="DejaVu Sans" panose="020B0603030804020204" pitchFamily="34" charset="0"/>
+              <a:cs typeface="DejaVu Sans" panose="020B0603030804020204" pitchFamily="34" charset="0"/>
+            </a:endParaRPr>
+          </a:p>
+        </p:txBody>
+      </p:sp>
     </p:spTree>
     <p:extLst>
       <p:ext uri="{BB962C8B-B14F-4D97-AF65-F5344CB8AC3E}">
@@ -3775,6 +4053,145 @@
           </p:spPr>
         </p:pic>
       </p:grpSp>
+      <p:sp>
+        <p:nvSpPr>
+          <p:cNvPr id="13" name="TextBox 12"/>
+          <p:cNvSpPr txBox="1"/>
+          <p:nvPr/>
+        </p:nvSpPr>
+        <p:spPr>
+          <a:xfrm>
+            <a:off x="651290" y="4529393"/>
+            <a:ext cx="1436612" cy="784830"/>
+          </a:xfrm>
+          <a:prstGeom prst="rect">
+            <a:avLst/>
+          </a:prstGeom>
+          <a:solidFill>
+            <a:schemeClr val="bg1"/>
+          </a:solidFill>
+        </p:spPr>
+        <p:txBody>
+          <a:bodyPr wrap="none" rtlCol="0">
+            <a:spAutoFit/>
+          </a:bodyPr>
+          <a:lstStyle/>
+          <a:p>
+            <a:endParaRPr lang="en-US" sz="900" dirty="0" smtClean="0">
+              <a:latin typeface="DejaVu Sans" panose="020B0603030804020204" pitchFamily="34" charset="0"/>
+              <a:ea typeface="DejaVu Sans" panose="020B0603030804020204" pitchFamily="34" charset="0"/>
+              <a:cs typeface="DejaVu Sans" panose="020B0603030804020204" pitchFamily="34" charset="0"/>
+            </a:endParaRPr>
+          </a:p>
+          <a:p>
+            <a:r>
+              <a:rPr lang="en-US" sz="900" dirty="0" smtClean="0">
+                <a:latin typeface="DejaVu Sans" panose="020B0603030804020204" pitchFamily="34" charset="0"/>
+                <a:ea typeface="DejaVu Sans" panose="020B0603030804020204" pitchFamily="34" charset="0"/>
+                <a:cs typeface="DejaVu Sans" panose="020B0603030804020204" pitchFamily="34" charset="0"/>
+              </a:rPr>
+              <a:t>Landing method:</a:t>
+            </a:r>
+          </a:p>
+          <a:p>
+            <a:r>
+              <a:rPr lang="en-US" sz="900" dirty="0" err="1" smtClean="0">
+                <a:latin typeface="DejaVu Sans" panose="020B0603030804020204" pitchFamily="34" charset="0"/>
+                <a:ea typeface="DejaVu Sans" panose="020B0603030804020204" pitchFamily="34" charset="0"/>
+                <a:cs typeface="DejaVu Sans" panose="020B0603030804020204" pitchFamily="34" charset="0"/>
+              </a:rPr>
+              <a:t>Recov</a:t>
+            </a:r>
+            <a:r>
+              <a:rPr lang="en-US" sz="900" dirty="0" smtClean="0">
+                <a:latin typeface="DejaVu Sans" panose="020B0603030804020204" pitchFamily="34" charset="0"/>
+                <a:ea typeface="DejaVu Sans" panose="020B0603030804020204" pitchFamily="34" charset="0"/>
+                <a:cs typeface="DejaVu Sans" panose="020B0603030804020204" pitchFamily="34" charset="0"/>
+              </a:rPr>
+              <a:t>. prop. method:</a:t>
+            </a:r>
+          </a:p>
+          <a:p>
+            <a:r>
+              <a:rPr lang="en-US" sz="900" dirty="0" smtClean="0">
+                <a:latin typeface="DejaVu Sans" panose="020B0603030804020204" pitchFamily="34" charset="0"/>
+                <a:ea typeface="DejaVu Sans" panose="020B0603030804020204" pitchFamily="34" charset="0"/>
+                <a:cs typeface="DejaVu Sans" panose="020B0603030804020204" pitchFamily="34" charset="0"/>
+              </a:rPr>
+              <a:t>Portion </a:t>
+            </a:r>
+            <a:r>
+              <a:rPr lang="en-US" sz="900" dirty="0" err="1" smtClean="0">
+                <a:latin typeface="DejaVu Sans" panose="020B0603030804020204" pitchFamily="34" charset="0"/>
+                <a:ea typeface="DejaVu Sans" panose="020B0603030804020204" pitchFamily="34" charset="0"/>
+                <a:cs typeface="DejaVu Sans" panose="020B0603030804020204" pitchFamily="34" charset="0"/>
+              </a:rPr>
+              <a:t>recov’d</a:t>
+            </a:r>
+            <a:r>
+              <a:rPr lang="en-US" sz="900" dirty="0" smtClean="0">
+                <a:latin typeface="DejaVu Sans" panose="020B0603030804020204" pitchFamily="34" charset="0"/>
+                <a:ea typeface="DejaVu Sans" panose="020B0603030804020204" pitchFamily="34" charset="0"/>
+                <a:cs typeface="DejaVu Sans" panose="020B0603030804020204" pitchFamily="34" charset="0"/>
+              </a:rPr>
+              <a:t>:</a:t>
+            </a:r>
+          </a:p>
+          <a:p>
+            <a:endParaRPr lang="en-US" sz="900" dirty="0">
+              <a:latin typeface="DejaVu Sans" panose="020B0603030804020204" pitchFamily="34" charset="0"/>
+              <a:ea typeface="DejaVu Sans" panose="020B0603030804020204" pitchFamily="34" charset="0"/>
+              <a:cs typeface="DejaVu Sans" panose="020B0603030804020204" pitchFamily="34" charset="0"/>
+            </a:endParaRPr>
+          </a:p>
+        </p:txBody>
+      </p:sp>
+      <p:sp>
+        <p:nvSpPr>
+          <p:cNvPr id="14" name="TextBox 13"/>
+          <p:cNvSpPr txBox="1"/>
+          <p:nvPr/>
+        </p:nvSpPr>
+        <p:spPr>
+          <a:xfrm>
+            <a:off x="947458" y="4267685"/>
+            <a:ext cx="1015021" cy="261610"/>
+          </a:xfrm>
+          <a:prstGeom prst="rect">
+            <a:avLst/>
+          </a:prstGeom>
+          <a:noFill/>
+        </p:spPr>
+        <p:txBody>
+          <a:bodyPr wrap="none" rtlCol="0">
+            <a:spAutoFit/>
+          </a:bodyPr>
+          <a:lstStyle/>
+          <a:p>
+            <a:r>
+              <a:rPr lang="en-US" sz="1100" dirty="0">
+                <a:latin typeface="DejaVu Sans" panose="020B0603030804020204" pitchFamily="34" charset="0"/>
+                <a:ea typeface="DejaVu Sans" panose="020B0603030804020204" pitchFamily="34" charset="0"/>
+                <a:cs typeface="DejaVu Sans" panose="020B0603030804020204" pitchFamily="34" charset="0"/>
+              </a:rPr>
+              <a:t>E</a:t>
+            </a:r>
+            <a:r>
+              <a:rPr lang="en-US" sz="1100" dirty="0" smtClean="0">
+                <a:latin typeface="DejaVu Sans" panose="020B0603030804020204" pitchFamily="34" charset="0"/>
+                <a:ea typeface="DejaVu Sans" panose="020B0603030804020204" pitchFamily="34" charset="0"/>
+                <a:cs typeface="DejaVu Sans" panose="020B0603030804020204" pitchFamily="34" charset="0"/>
+              </a:rPr>
+              <a:t>xpendable</a:t>
+            </a:r>
+            <a:endParaRPr lang="en-US" sz="1100" dirty="0">
+              <a:latin typeface="DejaVu Sans" panose="020B0603030804020204" pitchFamily="34" charset="0"/>
+              <a:ea typeface="DejaVu Sans" panose="020B0603030804020204" pitchFamily="34" charset="0"/>
+              <a:cs typeface="DejaVu Sans" panose="020B0603030804020204" pitchFamily="34" charset="0"/>
+            </a:endParaRPr>
+          </a:p>
+        </p:txBody>
+      </p:sp>
     </p:spTree>
     <p:extLst>
       <p:ext uri="{BB962C8B-B14F-4D97-AF65-F5344CB8AC3E}">
@@ -4053,6 +4470,145 @@
           </p:spPr>
         </p:pic>
       </p:grpSp>
+      <p:sp>
+        <p:nvSpPr>
+          <p:cNvPr id="14" name="TextBox 13"/>
+          <p:cNvSpPr txBox="1"/>
+          <p:nvPr/>
+        </p:nvSpPr>
+        <p:spPr>
+          <a:xfrm>
+            <a:off x="651290" y="4529393"/>
+            <a:ext cx="1436612" cy="784830"/>
+          </a:xfrm>
+          <a:prstGeom prst="rect">
+            <a:avLst/>
+          </a:prstGeom>
+          <a:solidFill>
+            <a:schemeClr val="bg1"/>
+          </a:solidFill>
+        </p:spPr>
+        <p:txBody>
+          <a:bodyPr wrap="none" rtlCol="0">
+            <a:spAutoFit/>
+          </a:bodyPr>
+          <a:lstStyle/>
+          <a:p>
+            <a:endParaRPr lang="en-US" sz="900" dirty="0" smtClean="0">
+              <a:latin typeface="DejaVu Sans" panose="020B0603030804020204" pitchFamily="34" charset="0"/>
+              <a:ea typeface="DejaVu Sans" panose="020B0603030804020204" pitchFamily="34" charset="0"/>
+              <a:cs typeface="DejaVu Sans" panose="020B0603030804020204" pitchFamily="34" charset="0"/>
+            </a:endParaRPr>
+          </a:p>
+          <a:p>
+            <a:r>
+              <a:rPr lang="en-US" sz="900" dirty="0" smtClean="0">
+                <a:latin typeface="DejaVu Sans" panose="020B0603030804020204" pitchFamily="34" charset="0"/>
+                <a:ea typeface="DejaVu Sans" panose="020B0603030804020204" pitchFamily="34" charset="0"/>
+                <a:cs typeface="DejaVu Sans" panose="020B0603030804020204" pitchFamily="34" charset="0"/>
+              </a:rPr>
+              <a:t>Landing method:</a:t>
+            </a:r>
+          </a:p>
+          <a:p>
+            <a:r>
+              <a:rPr lang="en-US" sz="900" dirty="0" err="1" smtClean="0">
+                <a:latin typeface="DejaVu Sans" panose="020B0603030804020204" pitchFamily="34" charset="0"/>
+                <a:ea typeface="DejaVu Sans" panose="020B0603030804020204" pitchFamily="34" charset="0"/>
+                <a:cs typeface="DejaVu Sans" panose="020B0603030804020204" pitchFamily="34" charset="0"/>
+              </a:rPr>
+              <a:t>Recov</a:t>
+            </a:r>
+            <a:r>
+              <a:rPr lang="en-US" sz="900" dirty="0" smtClean="0">
+                <a:latin typeface="DejaVu Sans" panose="020B0603030804020204" pitchFamily="34" charset="0"/>
+                <a:ea typeface="DejaVu Sans" panose="020B0603030804020204" pitchFamily="34" charset="0"/>
+                <a:cs typeface="DejaVu Sans" panose="020B0603030804020204" pitchFamily="34" charset="0"/>
+              </a:rPr>
+              <a:t>. prop. method:</a:t>
+            </a:r>
+          </a:p>
+          <a:p>
+            <a:r>
+              <a:rPr lang="en-US" sz="900" dirty="0" smtClean="0">
+                <a:latin typeface="DejaVu Sans" panose="020B0603030804020204" pitchFamily="34" charset="0"/>
+                <a:ea typeface="DejaVu Sans" panose="020B0603030804020204" pitchFamily="34" charset="0"/>
+                <a:cs typeface="DejaVu Sans" panose="020B0603030804020204" pitchFamily="34" charset="0"/>
+              </a:rPr>
+              <a:t>Portion </a:t>
+            </a:r>
+            <a:r>
+              <a:rPr lang="en-US" sz="900" dirty="0" err="1" smtClean="0">
+                <a:latin typeface="DejaVu Sans" panose="020B0603030804020204" pitchFamily="34" charset="0"/>
+                <a:ea typeface="DejaVu Sans" panose="020B0603030804020204" pitchFamily="34" charset="0"/>
+                <a:cs typeface="DejaVu Sans" panose="020B0603030804020204" pitchFamily="34" charset="0"/>
+              </a:rPr>
+              <a:t>recov’d</a:t>
+            </a:r>
+            <a:r>
+              <a:rPr lang="en-US" sz="900" dirty="0" smtClean="0">
+                <a:latin typeface="DejaVu Sans" panose="020B0603030804020204" pitchFamily="34" charset="0"/>
+                <a:ea typeface="DejaVu Sans" panose="020B0603030804020204" pitchFamily="34" charset="0"/>
+                <a:cs typeface="DejaVu Sans" panose="020B0603030804020204" pitchFamily="34" charset="0"/>
+              </a:rPr>
+              <a:t>:</a:t>
+            </a:r>
+          </a:p>
+          <a:p>
+            <a:endParaRPr lang="en-US" sz="900" dirty="0">
+              <a:latin typeface="DejaVu Sans" panose="020B0603030804020204" pitchFamily="34" charset="0"/>
+              <a:ea typeface="DejaVu Sans" panose="020B0603030804020204" pitchFamily="34" charset="0"/>
+              <a:cs typeface="DejaVu Sans" panose="020B0603030804020204" pitchFamily="34" charset="0"/>
+            </a:endParaRPr>
+          </a:p>
+        </p:txBody>
+      </p:sp>
+      <p:sp>
+        <p:nvSpPr>
+          <p:cNvPr id="15" name="TextBox 14"/>
+          <p:cNvSpPr txBox="1"/>
+          <p:nvPr/>
+        </p:nvSpPr>
+        <p:spPr>
+          <a:xfrm>
+            <a:off x="947458" y="4267685"/>
+            <a:ext cx="1015021" cy="261610"/>
+          </a:xfrm>
+          <a:prstGeom prst="rect">
+            <a:avLst/>
+          </a:prstGeom>
+          <a:noFill/>
+        </p:spPr>
+        <p:txBody>
+          <a:bodyPr wrap="none" rtlCol="0">
+            <a:spAutoFit/>
+          </a:bodyPr>
+          <a:lstStyle/>
+          <a:p>
+            <a:r>
+              <a:rPr lang="en-US" sz="1100" dirty="0">
+                <a:latin typeface="DejaVu Sans" panose="020B0603030804020204" pitchFamily="34" charset="0"/>
+                <a:ea typeface="DejaVu Sans" panose="020B0603030804020204" pitchFamily="34" charset="0"/>
+                <a:cs typeface="DejaVu Sans" panose="020B0603030804020204" pitchFamily="34" charset="0"/>
+              </a:rPr>
+              <a:t>E</a:t>
+            </a:r>
+            <a:r>
+              <a:rPr lang="en-US" sz="1100" dirty="0" smtClean="0">
+                <a:latin typeface="DejaVu Sans" panose="020B0603030804020204" pitchFamily="34" charset="0"/>
+                <a:ea typeface="DejaVu Sans" panose="020B0603030804020204" pitchFamily="34" charset="0"/>
+                <a:cs typeface="DejaVu Sans" panose="020B0603030804020204" pitchFamily="34" charset="0"/>
+              </a:rPr>
+              <a:t>xpendable</a:t>
+            </a:r>
+            <a:endParaRPr lang="en-US" sz="1100" dirty="0">
+              <a:latin typeface="DejaVu Sans" panose="020B0603030804020204" pitchFamily="34" charset="0"/>
+              <a:ea typeface="DejaVu Sans" panose="020B0603030804020204" pitchFamily="34" charset="0"/>
+              <a:cs typeface="DejaVu Sans" panose="020B0603030804020204" pitchFamily="34" charset="0"/>
+            </a:endParaRPr>
+          </a:p>
+        </p:txBody>
+      </p:sp>
     </p:spTree>
     <p:extLst>
       <p:ext uri="{BB962C8B-B14F-4D97-AF65-F5344CB8AC3E}">

</xml_diff>

<commit_message>
Fix text box overlap on perf dist plot.
</commit_message>
<xml_diff>
--- a/paper/figures/strategy_perf_annotated.pptx
+++ b/paper/figures/strategy_perf_annotated.pptx
@@ -107,6 +107,11 @@
       </a:defRPr>
     </a:lvl9pPr>
   </p:defaultTextStyle>
+  <p:extLst>
+    <p:ext uri="{EFAFB233-063F-42B5-8137-9DF3F51BA10A}">
+      <p15:sldGuideLst xmlns:p15="http://schemas.microsoft.com/office/powerpoint/2012/main"/>
+    </p:ext>
+  </p:extLst>
 </p:presentation>
 </file>
 
@@ -241,7 +246,7 @@
           <a:p>
             <a:fld id="{9F86D532-2D79-4052-BDC3-088705E07362}" type="datetimeFigureOut">
               <a:rPr lang="en-US" smtClean="0"/>
-              <a:t>9/12/2018</a:t>
+              <a:t>9/17/2018</a:t>
             </a:fld>
             <a:endParaRPr lang="en-US"/>
           </a:p>
@@ -411,7 +416,7 @@
           <a:p>
             <a:fld id="{9F86D532-2D79-4052-BDC3-088705E07362}" type="datetimeFigureOut">
               <a:rPr lang="en-US" smtClean="0"/>
-              <a:t>9/12/2018</a:t>
+              <a:t>9/17/2018</a:t>
             </a:fld>
             <a:endParaRPr lang="en-US"/>
           </a:p>
@@ -591,7 +596,7 @@
           <a:p>
             <a:fld id="{9F86D532-2D79-4052-BDC3-088705E07362}" type="datetimeFigureOut">
               <a:rPr lang="en-US" smtClean="0"/>
-              <a:t>9/12/2018</a:t>
+              <a:t>9/17/2018</a:t>
             </a:fld>
             <a:endParaRPr lang="en-US"/>
           </a:p>
@@ -761,7 +766,7 @@
           <a:p>
             <a:fld id="{9F86D532-2D79-4052-BDC3-088705E07362}" type="datetimeFigureOut">
               <a:rPr lang="en-US" smtClean="0"/>
-              <a:t>9/12/2018</a:t>
+              <a:t>9/17/2018</a:t>
             </a:fld>
             <a:endParaRPr lang="en-US"/>
           </a:p>
@@ -1007,7 +1012,7 @@
           <a:p>
             <a:fld id="{9F86D532-2D79-4052-BDC3-088705E07362}" type="datetimeFigureOut">
               <a:rPr lang="en-US" smtClean="0"/>
-              <a:t>9/12/2018</a:t>
+              <a:t>9/17/2018</a:t>
             </a:fld>
             <a:endParaRPr lang="en-US"/>
           </a:p>
@@ -1239,7 +1244,7 @@
           <a:p>
             <a:fld id="{9F86D532-2D79-4052-BDC3-088705E07362}" type="datetimeFigureOut">
               <a:rPr lang="en-US" smtClean="0"/>
-              <a:t>9/12/2018</a:t>
+              <a:t>9/17/2018</a:t>
             </a:fld>
             <a:endParaRPr lang="en-US"/>
           </a:p>
@@ -1606,7 +1611,7 @@
           <a:p>
             <a:fld id="{9F86D532-2D79-4052-BDC3-088705E07362}" type="datetimeFigureOut">
               <a:rPr lang="en-US" smtClean="0"/>
-              <a:t>9/12/2018</a:t>
+              <a:t>9/17/2018</a:t>
             </a:fld>
             <a:endParaRPr lang="en-US"/>
           </a:p>
@@ -1724,7 +1729,7 @@
           <a:p>
             <a:fld id="{9F86D532-2D79-4052-BDC3-088705E07362}" type="datetimeFigureOut">
               <a:rPr lang="en-US" smtClean="0"/>
-              <a:t>9/12/2018</a:t>
+              <a:t>9/17/2018</a:t>
             </a:fld>
             <a:endParaRPr lang="en-US"/>
           </a:p>
@@ -1819,7 +1824,7 @@
           <a:p>
             <a:fld id="{9F86D532-2D79-4052-BDC3-088705E07362}" type="datetimeFigureOut">
               <a:rPr lang="en-US" smtClean="0"/>
-              <a:t>9/12/2018</a:t>
+              <a:t>9/17/2018</a:t>
             </a:fld>
             <a:endParaRPr lang="en-US"/>
           </a:p>
@@ -2096,7 +2101,7 @@
           <a:p>
             <a:fld id="{9F86D532-2D79-4052-BDC3-088705E07362}" type="datetimeFigureOut">
               <a:rPr lang="en-US" smtClean="0"/>
-              <a:t>9/12/2018</a:t>
+              <a:t>9/17/2018</a:t>
             </a:fld>
             <a:endParaRPr lang="en-US"/>
           </a:p>
@@ -2353,7 +2358,7 @@
           <a:p>
             <a:fld id="{9F86D532-2D79-4052-BDC3-088705E07362}" type="datetimeFigureOut">
               <a:rPr lang="en-US" smtClean="0"/>
-              <a:t>9/12/2018</a:t>
+              <a:t>9/17/2018</a:t>
             </a:fld>
             <a:endParaRPr lang="en-US"/>
           </a:p>
@@ -2566,7 +2571,7 @@
           <a:p>
             <a:fld id="{9F86D532-2D79-4052-BDC3-088705E07362}" type="datetimeFigureOut">
               <a:rPr lang="en-US" smtClean="0"/>
-              <a:t>9/12/2018</a:t>
+              <a:t>9/17/2018</a:t>
             </a:fld>
             <a:endParaRPr lang="en-US"/>
           </a:p>
@@ -3644,7 +3649,7 @@
         </p:nvSpPr>
         <p:spPr>
           <a:xfrm>
-            <a:off x="530640" y="4529393"/>
+            <a:off x="479840" y="4529393"/>
             <a:ext cx="1436612" cy="784830"/>
           </a:xfrm>
           <a:prstGeom prst="rect">
@@ -4478,7 +4483,7 @@
         </p:nvSpPr>
         <p:spPr>
           <a:xfrm>
-            <a:off x="651290" y="4529393"/>
+            <a:off x="575090" y="4529393"/>
             <a:ext cx="1436612" cy="784830"/>
           </a:xfrm>
           <a:prstGeom prst="rect">

</xml_diff>